<commit_message>
Addition of LangChain Text
Re-arrange content order
</commit_message>
<xml_diff>
--- a/assets/Graphics.pptx
+++ b/assets/Graphics.pptx
@@ -7,6 +7,7 @@
   <p:sldIdLst>
     <p:sldId id="256" r:id="rId2"/>
     <p:sldId id="257" r:id="rId3"/>
+    <p:sldId id="258" r:id="rId4"/>
   </p:sldIdLst>
   <p:sldSz cx="12192000" cy="6858000"/>
   <p:notesSz cx="6858000" cy="9144000"/>
@@ -105,6 +106,11 @@
       </a:defRPr>
     </a:lvl9pPr>
   </p:defaultTextStyle>
+  <p:extLst>
+    <p:ext uri="{EFAFB233-063F-42B5-8137-9DF3F51BA10A}">
+      <p15:sldGuideLst xmlns:p15="http://schemas.microsoft.com/office/powerpoint/2012/main"/>
+    </p:ext>
+  </p:extLst>
 </p:presentation>
 </file>
 
@@ -255,7 +261,7 @@
           <a:p>
             <a:fld id="{03EF48FE-75D6-4F42-8361-B08150CB9112}" type="datetimeFigureOut">
               <a:rPr lang="en-US" smtClean="0"/>
-              <a:t>12/21/2023</a:t>
+              <a:t>12/26/2023</a:t>
             </a:fld>
             <a:endParaRPr lang="en-US"/>
           </a:p>
@@ -453,7 +459,7 @@
           <a:p>
             <a:fld id="{03EF48FE-75D6-4F42-8361-B08150CB9112}" type="datetimeFigureOut">
               <a:rPr lang="en-US" smtClean="0"/>
-              <a:t>12/21/2023</a:t>
+              <a:t>12/26/2023</a:t>
             </a:fld>
             <a:endParaRPr lang="en-US"/>
           </a:p>
@@ -661,7 +667,7 @@
           <a:p>
             <a:fld id="{03EF48FE-75D6-4F42-8361-B08150CB9112}" type="datetimeFigureOut">
               <a:rPr lang="en-US" smtClean="0"/>
-              <a:t>12/21/2023</a:t>
+              <a:t>12/26/2023</a:t>
             </a:fld>
             <a:endParaRPr lang="en-US"/>
           </a:p>
@@ -859,7 +865,7 @@
           <a:p>
             <a:fld id="{03EF48FE-75D6-4F42-8361-B08150CB9112}" type="datetimeFigureOut">
               <a:rPr lang="en-US" smtClean="0"/>
-              <a:t>12/21/2023</a:t>
+              <a:t>12/26/2023</a:t>
             </a:fld>
             <a:endParaRPr lang="en-US"/>
           </a:p>
@@ -1134,7 +1140,7 @@
           <a:p>
             <a:fld id="{03EF48FE-75D6-4F42-8361-B08150CB9112}" type="datetimeFigureOut">
               <a:rPr lang="en-US" smtClean="0"/>
-              <a:t>12/21/2023</a:t>
+              <a:t>12/26/2023</a:t>
             </a:fld>
             <a:endParaRPr lang="en-US"/>
           </a:p>
@@ -1399,7 +1405,7 @@
           <a:p>
             <a:fld id="{03EF48FE-75D6-4F42-8361-B08150CB9112}" type="datetimeFigureOut">
               <a:rPr lang="en-US" smtClean="0"/>
-              <a:t>12/21/2023</a:t>
+              <a:t>12/26/2023</a:t>
             </a:fld>
             <a:endParaRPr lang="en-US"/>
           </a:p>
@@ -1811,7 +1817,7 @@
           <a:p>
             <a:fld id="{03EF48FE-75D6-4F42-8361-B08150CB9112}" type="datetimeFigureOut">
               <a:rPr lang="en-US" smtClean="0"/>
-              <a:t>12/21/2023</a:t>
+              <a:t>12/26/2023</a:t>
             </a:fld>
             <a:endParaRPr lang="en-US"/>
           </a:p>
@@ -1952,7 +1958,7 @@
           <a:p>
             <a:fld id="{03EF48FE-75D6-4F42-8361-B08150CB9112}" type="datetimeFigureOut">
               <a:rPr lang="en-US" smtClean="0"/>
-              <a:t>12/21/2023</a:t>
+              <a:t>12/26/2023</a:t>
             </a:fld>
             <a:endParaRPr lang="en-US"/>
           </a:p>
@@ -2065,7 +2071,7 @@
           <a:p>
             <a:fld id="{03EF48FE-75D6-4F42-8361-B08150CB9112}" type="datetimeFigureOut">
               <a:rPr lang="en-US" smtClean="0"/>
-              <a:t>12/21/2023</a:t>
+              <a:t>12/26/2023</a:t>
             </a:fld>
             <a:endParaRPr lang="en-US"/>
           </a:p>
@@ -2376,7 +2382,7 @@
           <a:p>
             <a:fld id="{03EF48FE-75D6-4F42-8361-B08150CB9112}" type="datetimeFigureOut">
               <a:rPr lang="en-US" smtClean="0"/>
-              <a:t>12/21/2023</a:t>
+              <a:t>12/26/2023</a:t>
             </a:fld>
             <a:endParaRPr lang="en-US"/>
           </a:p>
@@ -2664,7 +2670,7 @@
           <a:p>
             <a:fld id="{03EF48FE-75D6-4F42-8361-B08150CB9112}" type="datetimeFigureOut">
               <a:rPr lang="en-US" smtClean="0"/>
-              <a:t>12/21/2023</a:t>
+              <a:t>12/26/2023</a:t>
             </a:fld>
             <a:endParaRPr lang="en-US"/>
           </a:p>
@@ -2905,7 +2911,7 @@
           <a:p>
             <a:fld id="{03EF48FE-75D6-4F42-8361-B08150CB9112}" type="datetimeFigureOut">
               <a:rPr lang="en-US" smtClean="0"/>
-              <a:t>12/21/2023</a:t>
+              <a:t>12/26/2023</a:t>
             </a:fld>
             <a:endParaRPr lang="en-US"/>
           </a:p>
@@ -5184,6 +5190,777 @@
 </p:sld>
 </file>
 
+<file path=ppt/slides/slide3.xml><?xml version="1.0" encoding="utf-8"?>
+<p:sld xmlns:a="http://schemas.openxmlformats.org/drawingml/2006/main" xmlns:r="http://schemas.openxmlformats.org/officeDocument/2006/relationships" xmlns:p="http://schemas.openxmlformats.org/presentationml/2006/main">
+  <p:cSld>
+    <p:spTree>
+      <p:nvGrpSpPr>
+        <p:cNvPr id="1" name=""/>
+        <p:cNvGrpSpPr/>
+        <p:nvPr/>
+      </p:nvGrpSpPr>
+      <p:grpSpPr>
+        <a:xfrm>
+          <a:off x="0" y="0"/>
+          <a:ext cx="0" cy="0"/>
+          <a:chOff x="0" y="0"/>
+          <a:chExt cx="0" cy="0"/>
+        </a:xfrm>
+      </p:grpSpPr>
+      <p:sp>
+        <p:nvSpPr>
+          <p:cNvPr id="2" name="Title 1">
+            <a:extLst>
+              <a:ext uri="{FF2B5EF4-FFF2-40B4-BE49-F238E27FC236}">
+                <a16:creationId xmlns:a16="http://schemas.microsoft.com/office/drawing/2014/main" id="{5C1A015E-E27D-2319-1E53-B4188A0C9ECB}"/>
+              </a:ext>
+            </a:extLst>
+          </p:cNvPr>
+          <p:cNvSpPr>
+            <a:spLocks noGrp="1"/>
+          </p:cNvSpPr>
+          <p:nvPr>
+            <p:ph type="title"/>
+          </p:nvPr>
+        </p:nvSpPr>
+        <p:spPr>
+          <a:xfrm>
+            <a:off x="156713" y="97642"/>
+            <a:ext cx="10515600" cy="1325563"/>
+          </a:xfrm>
+        </p:spPr>
+        <p:txBody>
+          <a:bodyPr/>
+          <a:lstStyle/>
+          <a:p>
+            <a:r>
+              <a:rPr lang="en-US" dirty="0" err="1"/>
+              <a:t>LangChain</a:t>
+            </a:r>
+            <a:r>
+              <a:rPr lang="en-US" dirty="0"/>
+              <a:t> RAG</a:t>
+            </a:r>
+          </a:p>
+        </p:txBody>
+      </p:sp>
+      <p:sp>
+        <p:nvSpPr>
+          <p:cNvPr id="5" name="Rectangle 4">
+            <a:extLst>
+              <a:ext uri="{FF2B5EF4-FFF2-40B4-BE49-F238E27FC236}">
+                <a16:creationId xmlns:a16="http://schemas.microsoft.com/office/drawing/2014/main" id="{C26E6969-A11D-87FA-1AB9-4A8CA265E907}"/>
+              </a:ext>
+            </a:extLst>
+          </p:cNvPr>
+          <p:cNvSpPr/>
+          <p:nvPr/>
+        </p:nvSpPr>
+        <p:spPr>
+          <a:xfrm>
+            <a:off x="243458" y="3186936"/>
+            <a:ext cx="1658579" cy="571850"/>
+          </a:xfrm>
+          <a:prstGeom prst="rect">
+            <a:avLst/>
+          </a:prstGeom>
+        </p:spPr>
+        <p:style>
+          <a:lnRef idx="1">
+            <a:schemeClr val="accent3"/>
+          </a:lnRef>
+          <a:fillRef idx="2">
+            <a:schemeClr val="accent3"/>
+          </a:fillRef>
+          <a:effectRef idx="1">
+            <a:schemeClr val="accent3"/>
+          </a:effectRef>
+          <a:fontRef idx="minor">
+            <a:schemeClr val="dk1"/>
+          </a:fontRef>
+        </p:style>
+        <p:txBody>
+          <a:bodyPr rtlCol="0" anchor="ctr"/>
+          <a:lstStyle/>
+          <a:p>
+            <a:pPr algn="ctr"/>
+            <a:r>
+              <a:rPr lang="en-US" dirty="0"/>
+              <a:t>Incoming Message</a:t>
+            </a:r>
+          </a:p>
+        </p:txBody>
+      </p:sp>
+      <p:pic>
+        <p:nvPicPr>
+          <p:cNvPr id="11" name="Graphic 10" descr="Document outline">
+            <a:extLst>
+              <a:ext uri="{FF2B5EF4-FFF2-40B4-BE49-F238E27FC236}">
+                <a16:creationId xmlns:a16="http://schemas.microsoft.com/office/drawing/2014/main" id="{967BD0ED-5F7E-3548-570C-473F9D6FEB5C}"/>
+              </a:ext>
+            </a:extLst>
+          </p:cNvPr>
+          <p:cNvPicPr>
+            <a:picLocks noChangeAspect="1"/>
+          </p:cNvPicPr>
+          <p:nvPr/>
+        </p:nvPicPr>
+        <p:blipFill>
+          <a:blip r:embed="rId2">
+            <a:extLst>
+              <a:ext uri="{28A0092B-C50C-407E-A947-70E740481C1C}">
+                <a14:useLocalDpi xmlns:a14="http://schemas.microsoft.com/office/drawing/2010/main" val="0"/>
+              </a:ext>
+              <a:ext uri="{96DAC541-7B7A-43D3-8B79-37D633B846F1}">
+                <asvg:svgBlip xmlns:asvg="http://schemas.microsoft.com/office/drawing/2016/SVG/main" r:embed="rId3"/>
+              </a:ext>
+            </a:extLst>
+          </a:blip>
+          <a:stretch>
+            <a:fillRect/>
+          </a:stretch>
+        </p:blipFill>
+        <p:spPr>
+          <a:xfrm>
+            <a:off x="2318687" y="2850176"/>
+            <a:ext cx="914400" cy="914400"/>
+          </a:xfrm>
+          <a:prstGeom prst="rect">
+            <a:avLst/>
+          </a:prstGeom>
+        </p:spPr>
+      </p:pic>
+      <p:pic>
+        <p:nvPicPr>
+          <p:cNvPr id="12" name="Graphic 11" descr="Document outline">
+            <a:extLst>
+              <a:ext uri="{FF2B5EF4-FFF2-40B4-BE49-F238E27FC236}">
+                <a16:creationId xmlns:a16="http://schemas.microsoft.com/office/drawing/2014/main" id="{15BA0F8A-75BA-BAD8-57E3-67442D1C704A}"/>
+              </a:ext>
+            </a:extLst>
+          </p:cNvPr>
+          <p:cNvPicPr>
+            <a:picLocks noChangeAspect="1"/>
+          </p:cNvPicPr>
+          <p:nvPr/>
+        </p:nvPicPr>
+        <p:blipFill>
+          <a:blip r:embed="rId2">
+            <a:extLst>
+              <a:ext uri="{28A0092B-C50C-407E-A947-70E740481C1C}">
+                <a14:useLocalDpi xmlns:a14="http://schemas.microsoft.com/office/drawing/2010/main" val="0"/>
+              </a:ext>
+              <a:ext uri="{96DAC541-7B7A-43D3-8B79-37D633B846F1}">
+                <asvg:svgBlip xmlns:asvg="http://schemas.microsoft.com/office/drawing/2016/SVG/main" r:embed="rId3"/>
+              </a:ext>
+            </a:extLst>
+          </a:blip>
+          <a:stretch>
+            <a:fillRect/>
+          </a:stretch>
+        </p:blipFill>
+        <p:spPr>
+          <a:xfrm>
+            <a:off x="2909905" y="3152996"/>
+            <a:ext cx="914400" cy="914400"/>
+          </a:xfrm>
+          <a:prstGeom prst="rect">
+            <a:avLst/>
+          </a:prstGeom>
+        </p:spPr>
+      </p:pic>
+      <p:pic>
+        <p:nvPicPr>
+          <p:cNvPr id="13" name="Graphic 12" descr="Document outline">
+            <a:extLst>
+              <a:ext uri="{FF2B5EF4-FFF2-40B4-BE49-F238E27FC236}">
+                <a16:creationId xmlns:a16="http://schemas.microsoft.com/office/drawing/2014/main" id="{170C547C-89D2-CE9B-8AE8-C0BC2FFBD735}"/>
+              </a:ext>
+            </a:extLst>
+          </p:cNvPr>
+          <p:cNvPicPr>
+            <a:picLocks noChangeAspect="1"/>
+          </p:cNvPicPr>
+          <p:nvPr/>
+        </p:nvPicPr>
+        <p:blipFill>
+          <a:blip r:embed="rId2">
+            <a:extLst>
+              <a:ext uri="{28A0092B-C50C-407E-A947-70E740481C1C}">
+                <a14:useLocalDpi xmlns:a14="http://schemas.microsoft.com/office/drawing/2010/main" val="0"/>
+              </a:ext>
+              <a:ext uri="{96DAC541-7B7A-43D3-8B79-37D633B846F1}">
+                <asvg:svgBlip xmlns:asvg="http://schemas.microsoft.com/office/drawing/2016/SVG/main" r:embed="rId3"/>
+              </a:ext>
+            </a:extLst>
+          </a:blip>
+          <a:stretch>
+            <a:fillRect/>
+          </a:stretch>
+        </p:blipFill>
+        <p:spPr>
+          <a:xfrm>
+            <a:off x="2286938" y="3726970"/>
+            <a:ext cx="914400" cy="914400"/>
+          </a:xfrm>
+          <a:prstGeom prst="rect">
+            <a:avLst/>
+          </a:prstGeom>
+        </p:spPr>
+      </p:pic>
+      <p:sp>
+        <p:nvSpPr>
+          <p:cNvPr id="14" name="TextBox 13">
+            <a:extLst>
+              <a:ext uri="{FF2B5EF4-FFF2-40B4-BE49-F238E27FC236}">
+                <a16:creationId xmlns:a16="http://schemas.microsoft.com/office/drawing/2014/main" id="{8FC30C36-EA02-A728-4EE9-F7FE4E26B42B}"/>
+              </a:ext>
+            </a:extLst>
+          </p:cNvPr>
+          <p:cNvSpPr txBox="1"/>
+          <p:nvPr/>
+        </p:nvSpPr>
+        <p:spPr>
+          <a:xfrm>
+            <a:off x="2227388" y="2256557"/>
+            <a:ext cx="1468159" cy="646331"/>
+          </a:xfrm>
+          <a:prstGeom prst="rect">
+            <a:avLst/>
+          </a:prstGeom>
+          <a:noFill/>
+        </p:spPr>
+        <p:txBody>
+          <a:bodyPr wrap="none" rtlCol="0">
+            <a:spAutoFit/>
+          </a:bodyPr>
+          <a:lstStyle/>
+          <a:p>
+            <a:pPr algn="ctr"/>
+            <a:r>
+              <a:rPr lang="en-US" b="1" dirty="0"/>
+              <a:t>Retriever</a:t>
+            </a:r>
+          </a:p>
+          <a:p>
+            <a:pPr algn="ctr"/>
+            <a:r>
+              <a:rPr lang="en-US" b="1" dirty="0"/>
+              <a:t>(vector store)</a:t>
+            </a:r>
+          </a:p>
+        </p:txBody>
+      </p:sp>
+      <p:sp>
+        <p:nvSpPr>
+          <p:cNvPr id="15" name="Rectangle 14">
+            <a:extLst>
+              <a:ext uri="{FF2B5EF4-FFF2-40B4-BE49-F238E27FC236}">
+                <a16:creationId xmlns:a16="http://schemas.microsoft.com/office/drawing/2014/main" id="{579F0BCC-DC8E-F09F-F2D5-6E09B07A5245}"/>
+              </a:ext>
+            </a:extLst>
+          </p:cNvPr>
+          <p:cNvSpPr/>
+          <p:nvPr/>
+        </p:nvSpPr>
+        <p:spPr>
+          <a:xfrm>
+            <a:off x="4129567" y="2709561"/>
+            <a:ext cx="1096569" cy="1773078"/>
+          </a:xfrm>
+          <a:prstGeom prst="rect">
+            <a:avLst/>
+          </a:prstGeom>
+        </p:spPr>
+        <p:style>
+          <a:lnRef idx="1">
+            <a:schemeClr val="accent4"/>
+          </a:lnRef>
+          <a:fillRef idx="2">
+            <a:schemeClr val="accent4"/>
+          </a:fillRef>
+          <a:effectRef idx="1">
+            <a:schemeClr val="accent4"/>
+          </a:effectRef>
+          <a:fontRef idx="minor">
+            <a:schemeClr val="dk1"/>
+          </a:fontRef>
+        </p:style>
+        <p:txBody>
+          <a:bodyPr rtlCol="0" anchor="ctr"/>
+          <a:lstStyle/>
+          <a:p>
+            <a:pPr algn="ctr"/>
+            <a:r>
+              <a:rPr lang="en-US" dirty="0"/>
+              <a:t>Build LLM prompt</a:t>
+            </a:r>
+          </a:p>
+        </p:txBody>
+      </p:sp>
+      <p:pic>
+        <p:nvPicPr>
+          <p:cNvPr id="16" name="Graphic 15" descr="Chat outline">
+            <a:extLst>
+              <a:ext uri="{FF2B5EF4-FFF2-40B4-BE49-F238E27FC236}">
+                <a16:creationId xmlns:a16="http://schemas.microsoft.com/office/drawing/2014/main" id="{20A460A5-179C-7E42-FEC8-7B23FB55CEC5}"/>
+              </a:ext>
+            </a:extLst>
+          </p:cNvPr>
+          <p:cNvPicPr>
+            <a:picLocks noChangeAspect="1"/>
+          </p:cNvPicPr>
+          <p:nvPr/>
+        </p:nvPicPr>
+        <p:blipFill>
+          <a:blip r:embed="rId4">
+            <a:extLst>
+              <a:ext uri="{28A0092B-C50C-407E-A947-70E740481C1C}">
+                <a14:useLocalDpi xmlns:a14="http://schemas.microsoft.com/office/drawing/2010/main" val="0"/>
+              </a:ext>
+              <a:ext uri="{96DAC541-7B7A-43D3-8B79-37D633B846F1}">
+                <asvg:svgBlip xmlns:asvg="http://schemas.microsoft.com/office/drawing/2016/SVG/main" r:embed="rId5"/>
+              </a:ext>
+            </a:extLst>
+          </a:blip>
+          <a:stretch>
+            <a:fillRect/>
+          </a:stretch>
+        </p:blipFill>
+        <p:spPr>
+          <a:xfrm>
+            <a:off x="412383" y="2415884"/>
+            <a:ext cx="914400" cy="914400"/>
+          </a:xfrm>
+          <a:prstGeom prst="rect">
+            <a:avLst/>
+          </a:prstGeom>
+        </p:spPr>
+      </p:pic>
+      <p:sp>
+        <p:nvSpPr>
+          <p:cNvPr id="17" name="Rectangle 16">
+            <a:extLst>
+              <a:ext uri="{FF2B5EF4-FFF2-40B4-BE49-F238E27FC236}">
+                <a16:creationId xmlns:a16="http://schemas.microsoft.com/office/drawing/2014/main" id="{FBB07BB6-6056-26B1-83C6-989088E5FEEB}"/>
+              </a:ext>
+            </a:extLst>
+          </p:cNvPr>
+          <p:cNvSpPr/>
+          <p:nvPr/>
+        </p:nvSpPr>
+        <p:spPr>
+          <a:xfrm>
+            <a:off x="243458" y="3910789"/>
+            <a:ext cx="1658579" cy="571850"/>
+          </a:xfrm>
+          <a:prstGeom prst="rect">
+            <a:avLst/>
+          </a:prstGeom>
+        </p:spPr>
+        <p:style>
+          <a:lnRef idx="1">
+            <a:schemeClr val="accent3"/>
+          </a:lnRef>
+          <a:fillRef idx="2">
+            <a:schemeClr val="accent3"/>
+          </a:fillRef>
+          <a:effectRef idx="1">
+            <a:schemeClr val="accent3"/>
+          </a:effectRef>
+          <a:fontRef idx="minor">
+            <a:schemeClr val="dk1"/>
+          </a:fontRef>
+        </p:style>
+        <p:txBody>
+          <a:bodyPr rtlCol="0" anchor="ctr"/>
+          <a:lstStyle/>
+          <a:p>
+            <a:pPr algn="ctr"/>
+            <a:r>
+              <a:rPr lang="en-US" dirty="0"/>
+              <a:t>LLM/</a:t>
+            </a:r>
+            <a:r>
+              <a:rPr lang="en-US" dirty="0" err="1"/>
+              <a:t>LangChain</a:t>
+            </a:r>
+            <a:endParaRPr lang="en-US" dirty="0"/>
+          </a:p>
+          <a:p>
+            <a:pPr algn="ctr"/>
+            <a:r>
+              <a:rPr lang="en-US" dirty="0"/>
+              <a:t>Response</a:t>
+            </a:r>
+          </a:p>
+        </p:txBody>
+      </p:sp>
+      <p:sp>
+        <p:nvSpPr>
+          <p:cNvPr id="18" name="Rectangle 17">
+            <a:extLst>
+              <a:ext uri="{FF2B5EF4-FFF2-40B4-BE49-F238E27FC236}">
+                <a16:creationId xmlns:a16="http://schemas.microsoft.com/office/drawing/2014/main" id="{10E7D2F3-D20F-CD89-87D7-FD6FC55C9B12}"/>
+              </a:ext>
+            </a:extLst>
+          </p:cNvPr>
+          <p:cNvSpPr/>
+          <p:nvPr/>
+        </p:nvSpPr>
+        <p:spPr>
+          <a:xfrm>
+            <a:off x="5735023" y="2708571"/>
+            <a:ext cx="1365662" cy="1774068"/>
+          </a:xfrm>
+          <a:prstGeom prst="rect">
+            <a:avLst/>
+          </a:prstGeom>
+        </p:spPr>
+        <p:style>
+          <a:lnRef idx="1">
+            <a:schemeClr val="accent6"/>
+          </a:lnRef>
+          <a:fillRef idx="2">
+            <a:schemeClr val="accent6"/>
+          </a:fillRef>
+          <a:effectRef idx="1">
+            <a:schemeClr val="accent6"/>
+          </a:effectRef>
+          <a:fontRef idx="minor">
+            <a:schemeClr val="dk1"/>
+          </a:fontRef>
+        </p:style>
+        <p:txBody>
+          <a:bodyPr rtlCol="0" anchor="ctr"/>
+          <a:lstStyle/>
+          <a:p>
+            <a:pPr algn="ctr"/>
+            <a:r>
+              <a:rPr lang="en-US" dirty="0"/>
+              <a:t>LLM</a:t>
+            </a:r>
+          </a:p>
+        </p:txBody>
+      </p:sp>
+      <p:cxnSp>
+        <p:nvCxnSpPr>
+          <p:cNvPr id="19" name="Straight Arrow Connector 18">
+            <a:extLst>
+              <a:ext uri="{FF2B5EF4-FFF2-40B4-BE49-F238E27FC236}">
+                <a16:creationId xmlns:a16="http://schemas.microsoft.com/office/drawing/2014/main" id="{B60DE554-1F00-E097-36E9-A68986999821}"/>
+              </a:ext>
+            </a:extLst>
+          </p:cNvPr>
+          <p:cNvCxnSpPr>
+            <a:cxnSpLocks/>
+          </p:cNvCxnSpPr>
+          <p:nvPr/>
+        </p:nvCxnSpPr>
+        <p:spPr>
+          <a:xfrm>
+            <a:off x="1902037" y="3443398"/>
+            <a:ext cx="541011" cy="0"/>
+          </a:xfrm>
+          <a:prstGeom prst="straightConnector1">
+            <a:avLst/>
+          </a:prstGeom>
+          <a:ln>
+            <a:tailEnd type="triangle"/>
+          </a:ln>
+        </p:spPr>
+        <p:style>
+          <a:lnRef idx="1">
+            <a:schemeClr val="dk1"/>
+          </a:lnRef>
+          <a:fillRef idx="0">
+            <a:schemeClr val="dk1"/>
+          </a:fillRef>
+          <a:effectRef idx="0">
+            <a:schemeClr val="dk1"/>
+          </a:effectRef>
+          <a:fontRef idx="minor">
+            <a:schemeClr val="tx1"/>
+          </a:fontRef>
+        </p:style>
+      </p:cxnSp>
+      <p:cxnSp>
+        <p:nvCxnSpPr>
+          <p:cNvPr id="23" name="Straight Arrow Connector 22">
+            <a:extLst>
+              <a:ext uri="{FF2B5EF4-FFF2-40B4-BE49-F238E27FC236}">
+                <a16:creationId xmlns:a16="http://schemas.microsoft.com/office/drawing/2014/main" id="{6E71C1DF-42BE-FF51-A5AE-334BD4B8329B}"/>
+              </a:ext>
+            </a:extLst>
+          </p:cNvPr>
+          <p:cNvCxnSpPr>
+            <a:cxnSpLocks/>
+          </p:cNvCxnSpPr>
+          <p:nvPr/>
+        </p:nvCxnSpPr>
+        <p:spPr>
+          <a:xfrm>
+            <a:off x="3824305" y="3486957"/>
+            <a:ext cx="264695" cy="0"/>
+          </a:xfrm>
+          <a:prstGeom prst="straightConnector1">
+            <a:avLst/>
+          </a:prstGeom>
+          <a:ln>
+            <a:tailEnd type="triangle"/>
+          </a:ln>
+        </p:spPr>
+        <p:style>
+          <a:lnRef idx="1">
+            <a:schemeClr val="dk1"/>
+          </a:lnRef>
+          <a:fillRef idx="0">
+            <a:schemeClr val="dk1"/>
+          </a:fillRef>
+          <a:effectRef idx="0">
+            <a:schemeClr val="dk1"/>
+          </a:effectRef>
+          <a:fontRef idx="minor">
+            <a:schemeClr val="tx1"/>
+          </a:fontRef>
+        </p:style>
+      </p:cxnSp>
+      <p:cxnSp>
+        <p:nvCxnSpPr>
+          <p:cNvPr id="24" name="Straight Arrow Connector 23">
+            <a:extLst>
+              <a:ext uri="{FF2B5EF4-FFF2-40B4-BE49-F238E27FC236}">
+                <a16:creationId xmlns:a16="http://schemas.microsoft.com/office/drawing/2014/main" id="{0A73F28F-7CC3-ADE5-79B3-E8DFB99A5D3C}"/>
+              </a:ext>
+            </a:extLst>
+          </p:cNvPr>
+          <p:cNvCxnSpPr>
+            <a:stCxn id="15" idx="3"/>
+            <a:endCxn id="18" idx="1"/>
+          </p:cNvCxnSpPr>
+          <p:nvPr/>
+        </p:nvCxnSpPr>
+        <p:spPr>
+          <a:xfrm flipV="1">
+            <a:off x="5226136" y="3595605"/>
+            <a:ext cx="508887" cy="495"/>
+          </a:xfrm>
+          <a:prstGeom prst="straightConnector1">
+            <a:avLst/>
+          </a:prstGeom>
+          <a:ln>
+            <a:tailEnd type="triangle"/>
+          </a:ln>
+        </p:spPr>
+        <p:style>
+          <a:lnRef idx="1">
+            <a:schemeClr val="dk1"/>
+          </a:lnRef>
+          <a:fillRef idx="0">
+            <a:schemeClr val="dk1"/>
+          </a:fillRef>
+          <a:effectRef idx="0">
+            <a:schemeClr val="dk1"/>
+          </a:effectRef>
+          <a:fontRef idx="minor">
+            <a:schemeClr val="tx1"/>
+          </a:fontRef>
+        </p:style>
+      </p:cxnSp>
+      <p:cxnSp>
+        <p:nvCxnSpPr>
+          <p:cNvPr id="25" name="Connector: Elbow 24">
+            <a:extLst>
+              <a:ext uri="{FF2B5EF4-FFF2-40B4-BE49-F238E27FC236}">
+                <a16:creationId xmlns:a16="http://schemas.microsoft.com/office/drawing/2014/main" id="{F0B38096-73FB-16CF-F776-DFFDE6B5D96D}"/>
+              </a:ext>
+            </a:extLst>
+          </p:cNvPr>
+          <p:cNvCxnSpPr>
+            <a:cxnSpLocks/>
+            <a:stCxn id="31" idx="2"/>
+            <a:endCxn id="17" idx="2"/>
+          </p:cNvCxnSpPr>
+          <p:nvPr/>
+        </p:nvCxnSpPr>
+        <p:spPr>
+          <a:xfrm rot="5400000">
+            <a:off x="4613803" y="938584"/>
+            <a:ext cx="3001" cy="7085109"/>
+          </a:xfrm>
+          <a:prstGeom prst="bentConnector3">
+            <a:avLst>
+              <a:gd name="adj1" fmla="val 7717461"/>
+            </a:avLst>
+          </a:prstGeom>
+          <a:ln>
+            <a:tailEnd type="triangle"/>
+          </a:ln>
+        </p:spPr>
+        <p:style>
+          <a:lnRef idx="1">
+            <a:schemeClr val="dk1"/>
+          </a:lnRef>
+          <a:fillRef idx="0">
+            <a:schemeClr val="dk1"/>
+          </a:fillRef>
+          <a:effectRef idx="0">
+            <a:schemeClr val="dk1"/>
+          </a:effectRef>
+          <a:fontRef idx="minor">
+            <a:schemeClr val="tx1"/>
+          </a:fontRef>
+        </p:style>
+      </p:cxnSp>
+      <p:sp>
+        <p:nvSpPr>
+          <p:cNvPr id="31" name="Rectangle 30">
+            <a:extLst>
+              <a:ext uri="{FF2B5EF4-FFF2-40B4-BE49-F238E27FC236}">
+                <a16:creationId xmlns:a16="http://schemas.microsoft.com/office/drawing/2014/main" id="{C438974C-9AAF-3E93-333B-DD319BB2A18E}"/>
+              </a:ext>
+            </a:extLst>
+          </p:cNvPr>
+          <p:cNvSpPr/>
+          <p:nvPr/>
+        </p:nvSpPr>
+        <p:spPr>
+          <a:xfrm>
+            <a:off x="7609572" y="2706560"/>
+            <a:ext cx="1096569" cy="1773078"/>
+          </a:xfrm>
+          <a:prstGeom prst="rect">
+            <a:avLst/>
+          </a:prstGeom>
+        </p:spPr>
+        <p:style>
+          <a:lnRef idx="1">
+            <a:schemeClr val="accent5"/>
+          </a:lnRef>
+          <a:fillRef idx="2">
+            <a:schemeClr val="accent5"/>
+          </a:fillRef>
+          <a:effectRef idx="1">
+            <a:schemeClr val="accent5"/>
+          </a:effectRef>
+          <a:fontRef idx="minor">
+            <a:schemeClr val="dk1"/>
+          </a:fontRef>
+        </p:style>
+        <p:txBody>
+          <a:bodyPr rtlCol="0" anchor="ctr"/>
+          <a:lstStyle/>
+          <a:p>
+            <a:pPr algn="ctr"/>
+            <a:r>
+              <a:rPr lang="en-US" dirty="0"/>
+              <a:t>Parse </a:t>
+            </a:r>
+          </a:p>
+          <a:p>
+            <a:pPr algn="ctr"/>
+            <a:r>
+              <a:rPr lang="en-US" dirty="0"/>
+              <a:t>output</a:t>
+            </a:r>
+          </a:p>
+        </p:txBody>
+      </p:sp>
+      <p:cxnSp>
+        <p:nvCxnSpPr>
+          <p:cNvPr id="32" name="Straight Arrow Connector 31">
+            <a:extLst>
+              <a:ext uri="{FF2B5EF4-FFF2-40B4-BE49-F238E27FC236}">
+                <a16:creationId xmlns:a16="http://schemas.microsoft.com/office/drawing/2014/main" id="{8085C33B-1651-8579-2A0D-3196BC65A018}"/>
+              </a:ext>
+            </a:extLst>
+          </p:cNvPr>
+          <p:cNvCxnSpPr/>
+          <p:nvPr/>
+        </p:nvCxnSpPr>
+        <p:spPr>
+          <a:xfrm flipV="1">
+            <a:off x="7123271" y="3610196"/>
+            <a:ext cx="508887" cy="495"/>
+          </a:xfrm>
+          <a:prstGeom prst="straightConnector1">
+            <a:avLst/>
+          </a:prstGeom>
+          <a:ln>
+            <a:tailEnd type="triangle"/>
+          </a:ln>
+        </p:spPr>
+        <p:style>
+          <a:lnRef idx="1">
+            <a:schemeClr val="dk1"/>
+          </a:lnRef>
+          <a:fillRef idx="0">
+            <a:schemeClr val="dk1"/>
+          </a:fillRef>
+          <a:effectRef idx="0">
+            <a:schemeClr val="dk1"/>
+          </a:effectRef>
+          <a:fontRef idx="minor">
+            <a:schemeClr val="tx1"/>
+          </a:fontRef>
+        </p:style>
+      </p:cxnSp>
+      <p:sp>
+        <p:nvSpPr>
+          <p:cNvPr id="33" name="TextBox 32">
+            <a:extLst>
+              <a:ext uri="{FF2B5EF4-FFF2-40B4-BE49-F238E27FC236}">
+                <a16:creationId xmlns:a16="http://schemas.microsoft.com/office/drawing/2014/main" id="{D9DC52F1-98E7-E53D-1ED9-33639B023E1F}"/>
+              </a:ext>
+            </a:extLst>
+          </p:cNvPr>
+          <p:cNvSpPr txBox="1"/>
+          <p:nvPr/>
+        </p:nvSpPr>
+        <p:spPr>
+          <a:xfrm>
+            <a:off x="7395916" y="2069056"/>
+            <a:ext cx="1523879" cy="646331"/>
+          </a:xfrm>
+          <a:prstGeom prst="rect">
+            <a:avLst/>
+          </a:prstGeom>
+          <a:noFill/>
+        </p:spPr>
+        <p:txBody>
+          <a:bodyPr wrap="none" rtlCol="0">
+            <a:spAutoFit/>
+          </a:bodyPr>
+          <a:lstStyle/>
+          <a:p>
+            <a:pPr algn="ctr"/>
+            <a:r>
+              <a:rPr lang="en-US" b="1" dirty="0"/>
+              <a:t>Output Parser</a:t>
+            </a:r>
+          </a:p>
+          <a:p>
+            <a:pPr algn="ctr"/>
+            <a:r>
+              <a:rPr lang="en-US" b="1" dirty="0"/>
+              <a:t>(optional)</a:t>
+            </a:r>
+          </a:p>
+        </p:txBody>
+      </p:sp>
+    </p:spTree>
+    <p:extLst>
+      <p:ext uri="{BB962C8B-B14F-4D97-AF65-F5344CB8AC3E}">
+        <p14:creationId xmlns:p14="http://schemas.microsoft.com/office/powerpoint/2010/main" val="4126810686"/>
+      </p:ext>
+    </p:extLst>
+  </p:cSld>
+  <p:clrMapOvr>
+    <a:masterClrMapping/>
+  </p:clrMapOvr>
+</p:sld>
+</file>
+
 <file path=ppt/theme/theme1.xml><?xml version="1.0" encoding="utf-8"?>
 <a:theme xmlns:a="http://schemas.openxmlformats.org/drawingml/2006/main" name="Office Theme">
   <a:themeElements>

</xml_diff>

<commit_message>
Load data, vector search sections
</commit_message>
<xml_diff>
--- a/assets/Graphics.pptx
+++ b/assets/Graphics.pptx
@@ -261,7 +261,7 @@
           <a:p>
             <a:fld id="{03EF48FE-75D6-4F42-8361-B08150CB9112}" type="datetimeFigureOut">
               <a:rPr lang="en-US" smtClean="0"/>
-              <a:t>12/26/2023</a:t>
+              <a:t>9/14/2024</a:t>
             </a:fld>
             <a:endParaRPr lang="en-US"/>
           </a:p>
@@ -459,7 +459,7 @@
           <a:p>
             <a:fld id="{03EF48FE-75D6-4F42-8361-B08150CB9112}" type="datetimeFigureOut">
               <a:rPr lang="en-US" smtClean="0"/>
-              <a:t>12/26/2023</a:t>
+              <a:t>9/14/2024</a:t>
             </a:fld>
             <a:endParaRPr lang="en-US"/>
           </a:p>
@@ -667,7 +667,7 @@
           <a:p>
             <a:fld id="{03EF48FE-75D6-4F42-8361-B08150CB9112}" type="datetimeFigureOut">
               <a:rPr lang="en-US" smtClean="0"/>
-              <a:t>12/26/2023</a:t>
+              <a:t>9/14/2024</a:t>
             </a:fld>
             <a:endParaRPr lang="en-US"/>
           </a:p>
@@ -865,7 +865,7 @@
           <a:p>
             <a:fld id="{03EF48FE-75D6-4F42-8361-B08150CB9112}" type="datetimeFigureOut">
               <a:rPr lang="en-US" smtClean="0"/>
-              <a:t>12/26/2023</a:t>
+              <a:t>9/14/2024</a:t>
             </a:fld>
             <a:endParaRPr lang="en-US"/>
           </a:p>
@@ -1140,7 +1140,7 @@
           <a:p>
             <a:fld id="{03EF48FE-75D6-4F42-8361-B08150CB9112}" type="datetimeFigureOut">
               <a:rPr lang="en-US" smtClean="0"/>
-              <a:t>12/26/2023</a:t>
+              <a:t>9/14/2024</a:t>
             </a:fld>
             <a:endParaRPr lang="en-US"/>
           </a:p>
@@ -1405,7 +1405,7 @@
           <a:p>
             <a:fld id="{03EF48FE-75D6-4F42-8361-B08150CB9112}" type="datetimeFigureOut">
               <a:rPr lang="en-US" smtClean="0"/>
-              <a:t>12/26/2023</a:t>
+              <a:t>9/14/2024</a:t>
             </a:fld>
             <a:endParaRPr lang="en-US"/>
           </a:p>
@@ -1817,7 +1817,7 @@
           <a:p>
             <a:fld id="{03EF48FE-75D6-4F42-8361-B08150CB9112}" type="datetimeFigureOut">
               <a:rPr lang="en-US" smtClean="0"/>
-              <a:t>12/26/2023</a:t>
+              <a:t>9/14/2024</a:t>
             </a:fld>
             <a:endParaRPr lang="en-US"/>
           </a:p>
@@ -1958,7 +1958,7 @@
           <a:p>
             <a:fld id="{03EF48FE-75D6-4F42-8361-B08150CB9112}" type="datetimeFigureOut">
               <a:rPr lang="en-US" smtClean="0"/>
-              <a:t>12/26/2023</a:t>
+              <a:t>9/14/2024</a:t>
             </a:fld>
             <a:endParaRPr lang="en-US"/>
           </a:p>
@@ -2071,7 +2071,7 @@
           <a:p>
             <a:fld id="{03EF48FE-75D6-4F42-8361-B08150CB9112}" type="datetimeFigureOut">
               <a:rPr lang="en-US" smtClean="0"/>
-              <a:t>12/26/2023</a:t>
+              <a:t>9/14/2024</a:t>
             </a:fld>
             <a:endParaRPr lang="en-US"/>
           </a:p>
@@ -2382,7 +2382,7 @@
           <a:p>
             <a:fld id="{03EF48FE-75D6-4F42-8361-B08150CB9112}" type="datetimeFigureOut">
               <a:rPr lang="en-US" smtClean="0"/>
-              <a:t>12/26/2023</a:t>
+              <a:t>9/14/2024</a:t>
             </a:fld>
             <a:endParaRPr lang="en-US"/>
           </a:p>
@@ -2670,7 +2670,7 @@
           <a:p>
             <a:fld id="{03EF48FE-75D6-4F42-8361-B08150CB9112}" type="datetimeFigureOut">
               <a:rPr lang="en-US" smtClean="0"/>
-              <a:t>12/26/2023</a:t>
+              <a:t>9/14/2024</a:t>
             </a:fld>
             <a:endParaRPr lang="en-US"/>
           </a:p>
@@ -2911,7 +2911,7 @@
           <a:p>
             <a:fld id="{03EF48FE-75D6-4F42-8361-B08150CB9112}" type="datetimeFigureOut">
               <a:rPr lang="en-US" smtClean="0"/>
-              <a:t>12/26/2023</a:t>
+              <a:t>9/14/2024</a:t>
             </a:fld>
             <a:endParaRPr lang="en-US"/>
           </a:p>
@@ -4004,13 +4004,8 @@
             <a:pPr algn="ctr"/>
             <a:r>
               <a:rPr lang="en-US" dirty="0"/>
-              <a:t>Mongo DB </a:t>
-            </a:r>
-            <a:r>
-              <a:rPr lang="en-US" dirty="0" err="1"/>
-              <a:t>vCore</a:t>
-            </a:r>
-            <a:endParaRPr lang="en-US" dirty="0"/>
+              <a:t>for NoSQL</a:t>
+            </a:r>
           </a:p>
           <a:p>
             <a:pPr algn="ctr"/>

</xml_diff>